<commit_message>
Update presentation: ABP Multi-Tenancy
</commit_message>
<xml_diff>
--- a/2023-01-17 Dotnet Foundation Summit 2023/ABP Multi-Tenancy.pptx
+++ b/2023-01-17 Dotnet Foundation Summit 2023/ABP Multi-Tenancy.pptx
@@ -20,9 +20,9 @@
     <p:sldId id="268" r:id="rId14"/>
     <p:sldId id="269" r:id="rId15"/>
     <p:sldId id="270" r:id="rId16"/>
-    <p:sldId id="271" r:id="rId17"/>
-    <p:sldId id="272" r:id="rId18"/>
-    <p:sldId id="273" r:id="rId19"/>
+    <p:sldId id="273" r:id="rId17"/>
+    <p:sldId id="271" r:id="rId18"/>
+    <p:sldId id="272" r:id="rId19"/>
     <p:sldId id="274" r:id="rId20"/>
     <p:sldId id="275" r:id="rId21"/>
     <p:sldId id="276" r:id="rId22"/>
@@ -291,7 +291,7 @@
           <a:p>
             <a:fld id="{2A14C9FE-EBC3-45D3-899C-58AAF4F8AF71}" type="datetimeFigureOut">
               <a:rPr lang="en-US" smtClean="0"/>
-              <a:t>12/30/2022</a:t>
+              <a:t>03-Jan-23</a:t>
             </a:fld>
             <a:endParaRPr lang="en-US"/>
           </a:p>
@@ -489,7 +489,7 @@
           <a:p>
             <a:fld id="{2A14C9FE-EBC3-45D3-899C-58AAF4F8AF71}" type="datetimeFigureOut">
               <a:rPr lang="en-US" smtClean="0"/>
-              <a:t>12/30/2022</a:t>
+              <a:t>03-Jan-23</a:t>
             </a:fld>
             <a:endParaRPr lang="en-US"/>
           </a:p>
@@ -697,7 +697,7 @@
           <a:p>
             <a:fld id="{2A14C9FE-EBC3-45D3-899C-58AAF4F8AF71}" type="datetimeFigureOut">
               <a:rPr lang="en-US" smtClean="0"/>
-              <a:t>12/30/2022</a:t>
+              <a:t>03-Jan-23</a:t>
             </a:fld>
             <a:endParaRPr lang="en-US"/>
           </a:p>
@@ -895,7 +895,7 @@
           <a:p>
             <a:fld id="{2A14C9FE-EBC3-45D3-899C-58AAF4F8AF71}" type="datetimeFigureOut">
               <a:rPr lang="en-US" smtClean="0"/>
-              <a:t>12/30/2022</a:t>
+              <a:t>03-Jan-23</a:t>
             </a:fld>
             <a:endParaRPr lang="en-US"/>
           </a:p>
@@ -1170,7 +1170,7 @@
           <a:p>
             <a:fld id="{2A14C9FE-EBC3-45D3-899C-58AAF4F8AF71}" type="datetimeFigureOut">
               <a:rPr lang="en-US" smtClean="0"/>
-              <a:t>12/30/2022</a:t>
+              <a:t>03-Jan-23</a:t>
             </a:fld>
             <a:endParaRPr lang="en-US"/>
           </a:p>
@@ -1435,7 +1435,7 @@
           <a:p>
             <a:fld id="{2A14C9FE-EBC3-45D3-899C-58AAF4F8AF71}" type="datetimeFigureOut">
               <a:rPr lang="en-US" smtClean="0"/>
-              <a:t>12/30/2022</a:t>
+              <a:t>03-Jan-23</a:t>
             </a:fld>
             <a:endParaRPr lang="en-US"/>
           </a:p>
@@ -1847,7 +1847,7 @@
           <a:p>
             <a:fld id="{2A14C9FE-EBC3-45D3-899C-58AAF4F8AF71}" type="datetimeFigureOut">
               <a:rPr lang="en-US" smtClean="0"/>
-              <a:t>12/30/2022</a:t>
+              <a:t>03-Jan-23</a:t>
             </a:fld>
             <a:endParaRPr lang="en-US"/>
           </a:p>
@@ -1988,7 +1988,7 @@
           <a:p>
             <a:fld id="{2A14C9FE-EBC3-45D3-899C-58AAF4F8AF71}" type="datetimeFigureOut">
               <a:rPr lang="en-US" smtClean="0"/>
-              <a:t>12/30/2022</a:t>
+              <a:t>03-Jan-23</a:t>
             </a:fld>
             <a:endParaRPr lang="en-US"/>
           </a:p>
@@ -2101,7 +2101,7 @@
           <a:p>
             <a:fld id="{2A14C9FE-EBC3-45D3-899C-58AAF4F8AF71}" type="datetimeFigureOut">
               <a:rPr lang="en-US" smtClean="0"/>
-              <a:t>12/30/2022</a:t>
+              <a:t>03-Jan-23</a:t>
             </a:fld>
             <a:endParaRPr lang="en-US"/>
           </a:p>
@@ -2412,7 +2412,7 @@
           <a:p>
             <a:fld id="{2A14C9FE-EBC3-45D3-899C-58AAF4F8AF71}" type="datetimeFigureOut">
               <a:rPr lang="en-US" smtClean="0"/>
-              <a:t>12/30/2022</a:t>
+              <a:t>03-Jan-23</a:t>
             </a:fld>
             <a:endParaRPr lang="en-US"/>
           </a:p>
@@ -2700,7 +2700,7 @@
           <a:p>
             <a:fld id="{2A14C9FE-EBC3-45D3-899C-58AAF4F8AF71}" type="datetimeFigureOut">
               <a:rPr lang="en-US" smtClean="0"/>
-              <a:t>12/30/2022</a:t>
+              <a:t>03-Jan-23</a:t>
             </a:fld>
             <a:endParaRPr lang="en-US"/>
           </a:p>
@@ -2941,7 +2941,7 @@
           <a:p>
             <a:fld id="{2A14C9FE-EBC3-45D3-899C-58AAF4F8AF71}" type="datetimeFigureOut">
               <a:rPr lang="en-US" smtClean="0"/>
-              <a:t>12/30/2022</a:t>
+              <a:t>03-Jan-23</a:t>
             </a:fld>
             <a:endParaRPr lang="en-US"/>
           </a:p>
@@ -4542,7 +4542,7 @@
                 <a:latin typeface="Euclid Circular B" panose="020B0504000000000000" pitchFamily="34" charset="0"/>
                 <a:ea typeface="Euclid Circular B" panose="020B0504000000000000" pitchFamily="34" charset="0"/>
               </a:rPr>
-              <a:t>Topic title</a:t>
+              <a:t>Determining the Current Tenant</a:t>
             </a:r>
           </a:p>
         </p:txBody>
@@ -4563,21 +4563,232 @@
             <p:ph idx="1"/>
           </p:nvPr>
         </p:nvSpPr>
-        <p:spPr/>
-        <p:txBody>
-          <a:bodyPr/>
-          <a:lstStyle/>
-          <a:p>
-            <a:r>
-              <a:rPr lang="en-US" dirty="0">
-                <a:latin typeface="Euclid Circular B" panose="020B0504000000000000" pitchFamily="34" charset="0"/>
-                <a:ea typeface="Euclid Circular B" panose="020B0504000000000000" pitchFamily="34" charset="0"/>
-              </a:rPr>
-              <a:t>Content</a:t>
-            </a:r>
-          </a:p>
-        </p:txBody>
-      </p:sp>
+        <p:spPr>
+          <a:xfrm>
+            <a:off x="838200" y="1825625"/>
+            <a:ext cx="10515600" cy="4603878"/>
+          </a:xfrm>
+        </p:spPr>
+        <p:txBody>
+          <a:bodyPr>
+            <a:normAutofit fontScale="92500" lnSpcReduction="20000"/>
+          </a:bodyPr>
+          <a:lstStyle/>
+          <a:p>
+            <a:pPr marL="0" indent="0">
+              <a:buNone/>
+            </a:pPr>
+            <a:r>
+              <a:rPr lang="en-US" b="1" u="sng" dirty="0">
+                <a:latin typeface="Euclid Circular B" panose="020B0504000000000000" pitchFamily="34" charset="0"/>
+                <a:ea typeface="Euclid Circular B" panose="020B0504000000000000" pitchFamily="34" charset="0"/>
+              </a:rPr>
+              <a:t>Tenant Resolvers</a:t>
+            </a:r>
+          </a:p>
+          <a:p>
+            <a:r>
+              <a:rPr lang="en-US" b="0" i="0" dirty="0" err="1">
+                <a:solidFill>
+                  <a:srgbClr val="D63384"/>
+                </a:solidFill>
+                <a:effectLst/>
+                <a:latin typeface="SFMono-Regular"/>
+              </a:rPr>
+              <a:t>CurrentUserTenantResolveContributor</a:t>
+            </a:r>
+            <a:endParaRPr lang="en-US" b="0" i="0" dirty="0">
+              <a:solidFill>
+                <a:srgbClr val="D63384"/>
+              </a:solidFill>
+              <a:effectLst/>
+              <a:latin typeface="Euclid Circular B" panose="020B0504000000000000" pitchFamily="34" charset="0"/>
+              <a:ea typeface="Euclid Circular B" panose="020B0504000000000000" pitchFamily="34" charset="0"/>
+            </a:endParaRPr>
+          </a:p>
+          <a:p>
+            <a:r>
+              <a:rPr lang="en-US" b="0" i="0" dirty="0" err="1">
+                <a:solidFill>
+                  <a:srgbClr val="D63384"/>
+                </a:solidFill>
+                <a:effectLst/>
+                <a:latin typeface="SFMono-Regular"/>
+              </a:rPr>
+              <a:t>QueryStringTenantResolveContributor</a:t>
+            </a:r>
+            <a:endParaRPr lang="en-US" dirty="0">
+              <a:solidFill>
+                <a:srgbClr val="D63384"/>
+              </a:solidFill>
+              <a:latin typeface="Euclid Circular B" panose="020B0504000000000000" pitchFamily="34" charset="0"/>
+              <a:ea typeface="Euclid Circular B" panose="020B0504000000000000" pitchFamily="34" charset="0"/>
+            </a:endParaRPr>
+          </a:p>
+          <a:p>
+            <a:r>
+              <a:rPr lang="en-US" b="0" i="0" dirty="0" err="1">
+                <a:solidFill>
+                  <a:srgbClr val="D63384"/>
+                </a:solidFill>
+                <a:effectLst/>
+                <a:latin typeface="SFMono-Regular"/>
+              </a:rPr>
+              <a:t>RouteTenantResolveContributor</a:t>
+            </a:r>
+            <a:endParaRPr lang="en-US" b="0" i="0" dirty="0">
+              <a:solidFill>
+                <a:srgbClr val="D63384"/>
+              </a:solidFill>
+              <a:effectLst/>
+              <a:latin typeface="Euclid Circular B" panose="020B0504000000000000" pitchFamily="34" charset="0"/>
+              <a:ea typeface="Euclid Circular B" panose="020B0504000000000000" pitchFamily="34" charset="0"/>
+            </a:endParaRPr>
+          </a:p>
+          <a:p>
+            <a:r>
+              <a:rPr lang="en-US" b="0" i="0" dirty="0" err="1">
+                <a:solidFill>
+                  <a:srgbClr val="D63384"/>
+                </a:solidFill>
+                <a:effectLst/>
+                <a:latin typeface="SFMono-Regular"/>
+              </a:rPr>
+              <a:t>HeaderTenantResolveContributor</a:t>
+            </a:r>
+            <a:endParaRPr lang="en-US" dirty="0">
+              <a:solidFill>
+                <a:srgbClr val="D63384"/>
+              </a:solidFill>
+              <a:latin typeface="Euclid Circular B" panose="020B0504000000000000" pitchFamily="34" charset="0"/>
+              <a:ea typeface="Euclid Circular B" panose="020B0504000000000000" pitchFamily="34" charset="0"/>
+            </a:endParaRPr>
+          </a:p>
+          <a:p>
+            <a:r>
+              <a:rPr lang="en-US" b="0" i="0" dirty="0" err="1">
+                <a:solidFill>
+                  <a:srgbClr val="D63384"/>
+                </a:solidFill>
+                <a:effectLst/>
+                <a:latin typeface="SFMono-Regular"/>
+              </a:rPr>
+              <a:t>CookieTenantResolveContributor</a:t>
+            </a:r>
+            <a:endParaRPr lang="en-US" b="0" i="0" dirty="0">
+              <a:solidFill>
+                <a:srgbClr val="D63384"/>
+              </a:solidFill>
+              <a:effectLst/>
+              <a:latin typeface="SFMono-Regular"/>
+            </a:endParaRPr>
+          </a:p>
+          <a:p>
+            <a:pPr marL="0" indent="0">
+              <a:buNone/>
+            </a:pPr>
+            <a:endParaRPr lang="en-US" dirty="0">
+              <a:solidFill>
+                <a:srgbClr val="D63384"/>
+              </a:solidFill>
+              <a:latin typeface="SFMono-Regular"/>
+              <a:ea typeface="Euclid Circular B" panose="020B0504000000000000" pitchFamily="34" charset="0"/>
+            </a:endParaRPr>
+          </a:p>
+          <a:p>
+            <a:pPr marL="0" indent="0">
+              <a:buNone/>
+            </a:pPr>
+            <a:endParaRPr lang="en-US" dirty="0">
+              <a:solidFill>
+                <a:srgbClr val="D63384"/>
+              </a:solidFill>
+              <a:latin typeface="SFMono-Regular"/>
+              <a:ea typeface="Euclid Circular B" panose="020B0504000000000000" pitchFamily="34" charset="0"/>
+            </a:endParaRPr>
+          </a:p>
+          <a:p>
+            <a:pPr marL="0" indent="0">
+              <a:buNone/>
+            </a:pPr>
+            <a:endParaRPr lang="en-US" dirty="0">
+              <a:solidFill>
+                <a:srgbClr val="D63384"/>
+              </a:solidFill>
+              <a:latin typeface="SFMono-Regular"/>
+              <a:ea typeface="Euclid Circular B" panose="020B0504000000000000" pitchFamily="34" charset="0"/>
+            </a:endParaRPr>
+          </a:p>
+          <a:p>
+            <a:pPr marL="0" indent="0">
+              <a:buNone/>
+            </a:pPr>
+            <a:endParaRPr lang="en-US" dirty="0">
+              <a:solidFill>
+                <a:srgbClr val="D63384"/>
+              </a:solidFill>
+              <a:latin typeface="SFMono-Regular"/>
+              <a:ea typeface="Euclid Circular B" panose="020B0504000000000000" pitchFamily="34" charset="0"/>
+            </a:endParaRPr>
+          </a:p>
+          <a:p>
+            <a:r>
+              <a:rPr lang="en-US" dirty="0"/>
+              <a:t>And Custom Resolvers (implement </a:t>
+            </a:r>
+            <a:r>
+              <a:rPr lang="en-US" b="0" i="0" dirty="0" err="1">
+                <a:solidFill>
+                  <a:srgbClr val="D63384"/>
+                </a:solidFill>
+                <a:effectLst/>
+                <a:latin typeface="SFMono-Regular"/>
+              </a:rPr>
+              <a:t>ITenantResolveContributor</a:t>
+            </a:r>
+            <a:r>
+              <a:rPr lang="en-US" dirty="0"/>
+              <a:t>)</a:t>
+            </a:r>
+          </a:p>
+          <a:p>
+            <a:endParaRPr lang="en-US" dirty="0">
+              <a:latin typeface="Euclid Circular B" panose="020B0504000000000000" pitchFamily="34" charset="0"/>
+              <a:ea typeface="Euclid Circular B" panose="020B0504000000000000" pitchFamily="34" charset="0"/>
+            </a:endParaRPr>
+          </a:p>
+        </p:txBody>
+      </p:sp>
+      <p:pic>
+        <p:nvPicPr>
+          <p:cNvPr id="7" name="Picture 6">
+            <a:extLst>
+              <a:ext uri="{FF2B5EF4-FFF2-40B4-BE49-F238E27FC236}">
+                <a16:creationId xmlns:a16="http://schemas.microsoft.com/office/drawing/2014/main" id="{925CB102-E533-4058-8A0D-B96AD44E03DD}"/>
+              </a:ext>
+            </a:extLst>
+          </p:cNvPr>
+          <p:cNvPicPr>
+            <a:picLocks noChangeAspect="1"/>
+          </p:cNvPicPr>
+          <p:nvPr/>
+        </p:nvPicPr>
+        <p:blipFill>
+          <a:blip r:embed="rId3"/>
+          <a:stretch>
+            <a:fillRect/>
+          </a:stretch>
+        </p:blipFill>
+        <p:spPr>
+          <a:xfrm>
+            <a:off x="1152739" y="4260366"/>
+            <a:ext cx="6498698" cy="1497526"/>
+          </a:xfrm>
+          <a:prstGeom prst="rect">
+            <a:avLst/>
+          </a:prstGeom>
+        </p:spPr>
+      </p:pic>
     </p:spTree>
     <p:extLst>
       <p:ext uri="{BB962C8B-B14F-4D97-AF65-F5344CB8AC3E}">
@@ -4651,7 +4862,7 @@
                 <a:latin typeface="Euclid Circular B" panose="020B0504000000000000" pitchFamily="34" charset="0"/>
                 <a:ea typeface="Euclid Circular B" panose="020B0504000000000000" pitchFamily="34" charset="0"/>
               </a:rPr>
-              <a:t>Topic title</a:t>
+              <a:t>Connection String Selection</a:t>
             </a:r>
           </a:p>
         </p:txBody>
@@ -4672,21 +4883,140 @@
             <p:ph idx="1"/>
           </p:nvPr>
         </p:nvSpPr>
-        <p:spPr/>
-        <p:txBody>
-          <a:bodyPr/>
-          <a:lstStyle/>
-          <a:p>
+        <p:spPr>
+          <a:xfrm>
+            <a:off x="5881751" y="1825625"/>
+            <a:ext cx="5718417" cy="4351338"/>
+          </a:xfrm>
+        </p:spPr>
+        <p:txBody>
+          <a:bodyPr/>
+          <a:lstStyle/>
+          <a:p>
+            <a:pPr marL="0" indent="0">
+              <a:buNone/>
+            </a:pPr>
+            <a:r>
+              <a:rPr lang="en-US" b="1" dirty="0">
+                <a:latin typeface="Euclid Circular B" panose="020B0504000000000000" pitchFamily="34" charset="0"/>
+                <a:ea typeface="Euclid Circular B" panose="020B0504000000000000" pitchFamily="34" charset="0"/>
+              </a:rPr>
+              <a:t>Dynamically </a:t>
+            </a:r>
             <a:r>
               <a:rPr lang="en-US" dirty="0">
                 <a:latin typeface="Euclid Circular B" panose="020B0504000000000000" pitchFamily="34" charset="0"/>
                 <a:ea typeface="Euclid Circular B" panose="020B0504000000000000" pitchFamily="34" charset="0"/>
               </a:rPr>
-              <a:t>Content</a:t>
-            </a:r>
-          </a:p>
-        </p:txBody>
-      </p:sp>
+              <a:t>selects connection string based on</a:t>
+            </a:r>
+          </a:p>
+          <a:p>
+            <a:r>
+              <a:rPr lang="en-US" dirty="0">
+                <a:latin typeface="Euclid Circular B" panose="020B0504000000000000" pitchFamily="34" charset="0"/>
+                <a:ea typeface="Euclid Circular B" panose="020B0504000000000000" pitchFamily="34" charset="0"/>
+              </a:rPr>
+              <a:t>The </a:t>
+            </a:r>
+            <a:r>
+              <a:rPr lang="en-US" b="1" dirty="0">
+                <a:latin typeface="Euclid Circular B" panose="020B0504000000000000" pitchFamily="34" charset="0"/>
+                <a:ea typeface="Euclid Circular B" panose="020B0504000000000000" pitchFamily="34" charset="0"/>
+              </a:rPr>
+              <a:t>current tenant</a:t>
+            </a:r>
+          </a:p>
+          <a:p>
+            <a:r>
+              <a:rPr lang="en-US" dirty="0">
+                <a:latin typeface="Euclid Circular B" panose="020B0504000000000000" pitchFamily="34" charset="0"/>
+                <a:ea typeface="Euclid Circular B" panose="020B0504000000000000" pitchFamily="34" charset="0"/>
+              </a:rPr>
+              <a:t>The </a:t>
+            </a:r>
+            <a:r>
+              <a:rPr lang="en-US" b="1" dirty="0">
+                <a:latin typeface="Euclid Circular B" panose="020B0504000000000000" pitchFamily="34" charset="0"/>
+                <a:ea typeface="Euclid Circular B" panose="020B0504000000000000" pitchFamily="34" charset="0"/>
+              </a:rPr>
+              <a:t>current module</a:t>
+            </a:r>
+            <a:r>
+              <a:rPr lang="en-US" dirty="0">
+                <a:latin typeface="Euclid Circular B" panose="020B0504000000000000" pitchFamily="34" charset="0"/>
+                <a:ea typeface="Euclid Circular B" panose="020B0504000000000000" pitchFamily="34" charset="0"/>
+              </a:rPr>
+              <a:t>	</a:t>
+            </a:r>
+          </a:p>
+          <a:p>
+            <a:pPr marL="0" indent="0">
+              <a:buNone/>
+            </a:pPr>
+            <a:endParaRPr lang="en-US" dirty="0">
+              <a:latin typeface="Euclid Circular B" panose="020B0504000000000000" pitchFamily="34" charset="0"/>
+              <a:ea typeface="Euclid Circular B" panose="020B0504000000000000" pitchFamily="34" charset="0"/>
+            </a:endParaRPr>
+          </a:p>
+          <a:p>
+            <a:pPr marL="0" indent="0">
+              <a:buNone/>
+            </a:pPr>
+            <a:r>
+              <a:rPr lang="en-US" dirty="0">
+                <a:latin typeface="Euclid Circular B" panose="020B0504000000000000" pitchFamily="34" charset="0"/>
+                <a:ea typeface="Euclid Circular B" panose="020B0504000000000000" pitchFamily="34" charset="0"/>
+              </a:rPr>
+              <a:t>Fallbacks to the </a:t>
+            </a:r>
+            <a:r>
+              <a:rPr lang="en-US" b="1" dirty="0">
+                <a:latin typeface="Euclid Circular B" panose="020B0504000000000000" pitchFamily="34" charset="0"/>
+                <a:ea typeface="Euclid Circular B" panose="020B0504000000000000" pitchFamily="34" charset="0"/>
+              </a:rPr>
+              <a:t>default </a:t>
+            </a:r>
+            <a:r>
+              <a:rPr lang="en-US" dirty="0">
+                <a:latin typeface="Euclid Circular B" panose="020B0504000000000000" pitchFamily="34" charset="0"/>
+                <a:ea typeface="Euclid Circular B" panose="020B0504000000000000" pitchFamily="34" charset="0"/>
+              </a:rPr>
+              <a:t>connection string</a:t>
+            </a:r>
+          </a:p>
+        </p:txBody>
+      </p:sp>
+      <p:pic>
+        <p:nvPicPr>
+          <p:cNvPr id="7" name="Picture 6">
+            <a:extLst>
+              <a:ext uri="{FF2B5EF4-FFF2-40B4-BE49-F238E27FC236}">
+                <a16:creationId xmlns:a16="http://schemas.microsoft.com/office/drawing/2014/main" id="{36C77628-2045-3659-0DBB-DD9BFEE891B6}"/>
+              </a:ext>
+            </a:extLst>
+          </p:cNvPr>
+          <p:cNvPicPr>
+            <a:picLocks noChangeAspect="1"/>
+          </p:cNvPicPr>
+          <p:nvPr/>
+        </p:nvPicPr>
+        <p:blipFill>
+          <a:blip r:embed="rId3"/>
+          <a:stretch>
+            <a:fillRect/>
+          </a:stretch>
+        </p:blipFill>
+        <p:spPr>
+          <a:xfrm>
+            <a:off x="905815" y="1825625"/>
+            <a:ext cx="4705350" cy="3505200"/>
+          </a:xfrm>
+          <a:prstGeom prst="rect">
+            <a:avLst/>
+          </a:prstGeom>
+        </p:spPr>
+      </p:pic>
     </p:spTree>
     <p:extLst>
       <p:ext uri="{BB962C8B-B14F-4D97-AF65-F5344CB8AC3E}">
@@ -4753,6 +5083,16 @@
           <a:lstStyle/>
           <a:p>
             <a:r>
+              <a:rPr lang="en-US" b="1" dirty="0" err="1">
+                <a:solidFill>
+                  <a:srgbClr val="292D33"/>
+                </a:solidFill>
+                <a:latin typeface="Euclid Circular B" panose="020B0504000000000000" pitchFamily="34" charset="0"/>
+                <a:ea typeface="Euclid Circular B" panose="020B0504000000000000" pitchFamily="34" charset="0"/>
+              </a:rPr>
+              <a:t>ICurrentTenant</a:t>
+            </a:r>
+            <a:br>
               <a:rPr lang="en-US" b="1" dirty="0">
                 <a:solidFill>
                   <a:srgbClr val="292D33"/>
@@ -4760,7 +5100,16 @@
                 <a:latin typeface="Euclid Circular B" panose="020B0504000000000000" pitchFamily="34" charset="0"/>
                 <a:ea typeface="Euclid Circular B" panose="020B0504000000000000" pitchFamily="34" charset="0"/>
               </a:rPr>
-              <a:t>Topic title</a:t>
+            </a:br>
+            <a:r>
+              <a:rPr lang="en-US" sz="3200" b="1" dirty="0">
+                <a:solidFill>
+                  <a:srgbClr val="292D33"/>
+                </a:solidFill>
+                <a:latin typeface="Euclid Circular B" panose="020B0504000000000000" pitchFamily="34" charset="0"/>
+                <a:ea typeface="Euclid Circular B" panose="020B0504000000000000" pitchFamily="34" charset="0"/>
+              </a:rPr>
+              <a:t>getting the current tenant</a:t>
             </a:r>
           </a:p>
         </p:txBody>
@@ -4787,11 +5136,48 @@
           <a:lstStyle/>
           <a:p>
             <a:r>
+              <a:rPr lang="en-US" b="1" dirty="0">
+                <a:latin typeface="Euclid Circular B" panose="020B0504000000000000" pitchFamily="34" charset="0"/>
+                <a:ea typeface="Euclid Circular B" panose="020B0504000000000000" pitchFamily="34" charset="0"/>
+              </a:rPr>
+              <a:t>Id</a:t>
+            </a:r>
+            <a:r>
               <a:rPr lang="en-US" dirty="0">
                 <a:latin typeface="Euclid Circular B" panose="020B0504000000000000" pitchFamily="34" charset="0"/>
                 <a:ea typeface="Euclid Circular B" panose="020B0504000000000000" pitchFamily="34" charset="0"/>
               </a:rPr>
-              <a:t>Content</a:t>
+              <a:t> (</a:t>
+            </a:r>
+            <a:r>
+              <a:rPr lang="en-US" dirty="0" err="1">
+                <a:latin typeface="Euclid Circular B" panose="020B0504000000000000" pitchFamily="34" charset="0"/>
+                <a:ea typeface="Euclid Circular B" panose="020B0504000000000000" pitchFamily="34" charset="0"/>
+              </a:rPr>
+              <a:t>Guid</a:t>
+            </a:r>
+            <a:r>
+              <a:rPr lang="en-US" dirty="0">
+                <a:latin typeface="Euclid Circular B" panose="020B0504000000000000" pitchFamily="34" charset="0"/>
+                <a:ea typeface="Euclid Circular B" panose="020B0504000000000000" pitchFamily="34" charset="0"/>
+              </a:rPr>
+              <a:t>): Id of the current tenant. Can be null.</a:t>
+            </a:r>
+          </a:p>
+          <a:p>
+            <a:r>
+              <a:rPr lang="en-US" b="1" dirty="0">
+                <a:latin typeface="Euclid Circular B" panose="020B0504000000000000" pitchFamily="34" charset="0"/>
+                <a:ea typeface="Euclid Circular B" panose="020B0504000000000000" pitchFamily="34" charset="0"/>
+              </a:rPr>
+              <a:t>Name </a:t>
+            </a:r>
+            <a:r>
+              <a:rPr lang="en-US" dirty="0">
+                <a:latin typeface="Euclid Circular B" panose="020B0504000000000000" pitchFamily="34" charset="0"/>
+                <a:ea typeface="Euclid Circular B" panose="020B0504000000000000" pitchFamily="34" charset="0"/>
+              </a:rPr>
+              <a:t>(string): Name of the current tenant. Can be null.</a:t>
             </a:r>
           </a:p>
         </p:txBody>
@@ -4799,7 +5185,7 @@
     </p:spTree>
     <p:extLst>
       <p:ext uri="{BB962C8B-B14F-4D97-AF65-F5344CB8AC3E}">
-        <p14:creationId xmlns:p14="http://schemas.microsoft.com/office/powerpoint/2010/main" val="1917572127"/>
+        <p14:creationId xmlns:p14="http://schemas.microsoft.com/office/powerpoint/2010/main" val="4090653662"/>
       </p:ext>
     </p:extLst>
   </p:cSld>
@@ -4862,6 +5248,16 @@
           <a:lstStyle/>
           <a:p>
             <a:r>
+              <a:rPr lang="en-US" b="1" dirty="0" err="1">
+                <a:solidFill>
+                  <a:srgbClr val="292D33"/>
+                </a:solidFill>
+                <a:latin typeface="Euclid Circular B" panose="020B0504000000000000" pitchFamily="34" charset="0"/>
+                <a:ea typeface="Euclid Circular B" panose="020B0504000000000000" pitchFamily="34" charset="0"/>
+              </a:rPr>
+              <a:t>ICurrentTenant</a:t>
+            </a:r>
+            <a:br>
               <a:rPr lang="en-US" b="1" dirty="0">
                 <a:solidFill>
                   <a:srgbClr val="292D33"/>
@@ -4869,46 +5265,54 @@
                 <a:latin typeface="Euclid Circular B" panose="020B0504000000000000" pitchFamily="34" charset="0"/>
                 <a:ea typeface="Euclid Circular B" panose="020B0504000000000000" pitchFamily="34" charset="0"/>
               </a:rPr>
-              <a:t>Topic title</a:t>
-            </a:r>
-          </a:p>
-        </p:txBody>
-      </p:sp>
-      <p:sp>
-        <p:nvSpPr>
-          <p:cNvPr id="3" name="Content Placeholder 2">
-            <a:extLst>
-              <a:ext uri="{FF2B5EF4-FFF2-40B4-BE49-F238E27FC236}">
-                <a16:creationId xmlns:a16="http://schemas.microsoft.com/office/drawing/2014/main" id="{891C7693-D3DF-4635-96F4-97F3B4136FDF}"/>
-              </a:ext>
-            </a:extLst>
-          </p:cNvPr>
-          <p:cNvSpPr>
-            <a:spLocks noGrp="1"/>
-          </p:cNvSpPr>
-          <p:nvPr>
-            <p:ph idx="1"/>
-          </p:nvPr>
-        </p:nvSpPr>
-        <p:spPr/>
-        <p:txBody>
-          <a:bodyPr/>
-          <a:lstStyle/>
-          <a:p>
-            <a:r>
-              <a:rPr lang="en-US" dirty="0">
-                <a:latin typeface="Euclid Circular B" panose="020B0504000000000000" pitchFamily="34" charset="0"/>
-                <a:ea typeface="Euclid Circular B" panose="020B0504000000000000" pitchFamily="34" charset="0"/>
-              </a:rPr>
-              <a:t>Content</a:t>
-            </a:r>
-          </a:p>
-        </p:txBody>
-      </p:sp>
+            </a:br>
+            <a:r>
+              <a:rPr lang="en-US" sz="3200" b="1" dirty="0">
+                <a:solidFill>
+                  <a:srgbClr val="292D33"/>
+                </a:solidFill>
+                <a:latin typeface="Euclid Circular B" panose="020B0504000000000000" pitchFamily="34" charset="0"/>
+                <a:ea typeface="Euclid Circular B" panose="020B0504000000000000" pitchFamily="34" charset="0"/>
+              </a:rPr>
+              <a:t>switch the current tenant</a:t>
+            </a:r>
+          </a:p>
+        </p:txBody>
+      </p:sp>
+      <p:pic>
+        <p:nvPicPr>
+          <p:cNvPr id="7" name="Picture 6">
+            <a:extLst>
+              <a:ext uri="{FF2B5EF4-FFF2-40B4-BE49-F238E27FC236}">
+                <a16:creationId xmlns:a16="http://schemas.microsoft.com/office/drawing/2014/main" id="{7D2603CF-E7F4-C290-2B46-7C49C7B0659C}"/>
+              </a:ext>
+            </a:extLst>
+          </p:cNvPr>
+          <p:cNvPicPr>
+            <a:picLocks noChangeAspect="1"/>
+          </p:cNvPicPr>
+          <p:nvPr/>
+        </p:nvPicPr>
+        <p:blipFill>
+          <a:blip r:embed="rId3"/>
+          <a:stretch>
+            <a:fillRect/>
+          </a:stretch>
+        </p:blipFill>
+        <p:spPr>
+          <a:xfrm>
+            <a:off x="838200" y="1696196"/>
+            <a:ext cx="8316988" cy="4796679"/>
+          </a:xfrm>
+          <a:prstGeom prst="rect">
+            <a:avLst/>
+          </a:prstGeom>
+        </p:spPr>
+      </p:pic>
     </p:spTree>
     <p:extLst>
       <p:ext uri="{BB962C8B-B14F-4D97-AF65-F5344CB8AC3E}">
-        <p14:creationId xmlns:p14="http://schemas.microsoft.com/office/powerpoint/2010/main" val="1965016690"/>
+        <p14:creationId xmlns:p14="http://schemas.microsoft.com/office/powerpoint/2010/main" val="1917572127"/>
       </p:ext>
     </p:extLst>
   </p:cSld>
@@ -4978,46 +5382,45 @@
                 <a:latin typeface="Euclid Circular B" panose="020B0504000000000000" pitchFamily="34" charset="0"/>
                 <a:ea typeface="Euclid Circular B" panose="020B0504000000000000" pitchFamily="34" charset="0"/>
               </a:rPr>
-              <a:t>Topic title</a:t>
-            </a:r>
-          </a:p>
-        </p:txBody>
-      </p:sp>
-      <p:sp>
-        <p:nvSpPr>
-          <p:cNvPr id="3" name="Content Placeholder 2">
-            <a:extLst>
-              <a:ext uri="{FF2B5EF4-FFF2-40B4-BE49-F238E27FC236}">
-                <a16:creationId xmlns:a16="http://schemas.microsoft.com/office/drawing/2014/main" id="{891C7693-D3DF-4635-96F4-97F3B4136FDF}"/>
-              </a:ext>
-            </a:extLst>
-          </p:cNvPr>
-          <p:cNvSpPr>
-            <a:spLocks noGrp="1"/>
-          </p:cNvSpPr>
-          <p:nvPr>
-            <p:ph idx="1"/>
-          </p:nvPr>
-        </p:nvSpPr>
-        <p:spPr/>
-        <p:txBody>
-          <a:bodyPr/>
-          <a:lstStyle/>
-          <a:p>
-            <a:r>
-              <a:rPr lang="en-US" dirty="0">
-                <a:latin typeface="Euclid Circular B" panose="020B0504000000000000" pitchFamily="34" charset="0"/>
-                <a:ea typeface="Euclid Circular B" panose="020B0504000000000000" pitchFamily="34" charset="0"/>
-              </a:rPr>
-              <a:t>Content</a:t>
-            </a:r>
-          </a:p>
-        </p:txBody>
-      </p:sp>
+              <a:t>Disabling Multi-Tenancy Filter</a:t>
+            </a:r>
+          </a:p>
+        </p:txBody>
+      </p:sp>
+      <p:pic>
+        <p:nvPicPr>
+          <p:cNvPr id="7" name="Picture 6">
+            <a:extLst>
+              <a:ext uri="{FF2B5EF4-FFF2-40B4-BE49-F238E27FC236}">
+                <a16:creationId xmlns:a16="http://schemas.microsoft.com/office/drawing/2014/main" id="{162F32EC-8713-52D9-F86A-B4CB2918DFE3}"/>
+              </a:ext>
+            </a:extLst>
+          </p:cNvPr>
+          <p:cNvPicPr>
+            <a:picLocks noChangeAspect="1"/>
+          </p:cNvPicPr>
+          <p:nvPr/>
+        </p:nvPicPr>
+        <p:blipFill>
+          <a:blip r:embed="rId3"/>
+          <a:stretch>
+            <a:fillRect/>
+          </a:stretch>
+        </p:blipFill>
+        <p:spPr>
+          <a:xfrm>
+            <a:off x="838200" y="1690688"/>
+            <a:ext cx="7920578" cy="4837191"/>
+          </a:xfrm>
+          <a:prstGeom prst="rect">
+            <a:avLst/>
+          </a:prstGeom>
+        </p:spPr>
+      </p:pic>
     </p:spTree>
     <p:extLst>
       <p:ext uri="{BB962C8B-B14F-4D97-AF65-F5344CB8AC3E}">
-        <p14:creationId xmlns:p14="http://schemas.microsoft.com/office/powerpoint/2010/main" val="4090653662"/>
+        <p14:creationId xmlns:p14="http://schemas.microsoft.com/office/powerpoint/2010/main" val="1965016690"/>
       </p:ext>
     </p:extLst>
   </p:cSld>
@@ -5087,7 +5490,7 @@
                 <a:latin typeface="Euclid Circular B" panose="020B0504000000000000" pitchFamily="34" charset="0"/>
                 <a:ea typeface="Euclid Circular B" panose="020B0504000000000000" pitchFamily="34" charset="0"/>
               </a:rPr>
-              <a:t>Topic title</a:t>
+              <a:t>The Feature System</a:t>
             </a:r>
           </a:p>
         </p:txBody>
@@ -5114,12 +5517,178 @@
           <a:lstStyle/>
           <a:p>
             <a:r>
+              <a:rPr lang="en-US" b="1" dirty="0">
+                <a:latin typeface="Euclid Circular B" panose="020B0504000000000000" pitchFamily="34" charset="0"/>
+                <a:ea typeface="Euclid Circular B" panose="020B0504000000000000" pitchFamily="34" charset="0"/>
+              </a:rPr>
+              <a:t>Enable</a:t>
+            </a:r>
+            <a:r>
               <a:rPr lang="en-US" dirty="0">
                 <a:latin typeface="Euclid Circular B" panose="020B0504000000000000" pitchFamily="34" charset="0"/>
                 <a:ea typeface="Euclid Circular B" panose="020B0504000000000000" pitchFamily="34" charset="0"/>
               </a:rPr>
-              <a:t>Content</a:t>
-            </a:r>
+              <a:t>, </a:t>
+            </a:r>
+            <a:r>
+              <a:rPr lang="en-US" b="1" dirty="0">
+                <a:latin typeface="Euclid Circular B" panose="020B0504000000000000" pitchFamily="34" charset="0"/>
+                <a:ea typeface="Euclid Circular B" panose="020B0504000000000000" pitchFamily="34" charset="0"/>
+              </a:rPr>
+              <a:t>disable </a:t>
+            </a:r>
+            <a:r>
+              <a:rPr lang="en-US" dirty="0">
+                <a:latin typeface="Euclid Circular B" panose="020B0504000000000000" pitchFamily="34" charset="0"/>
+                <a:ea typeface="Euclid Circular B" panose="020B0504000000000000" pitchFamily="34" charset="0"/>
+              </a:rPr>
+              <a:t>or </a:t>
+            </a:r>
+            <a:r>
+              <a:rPr lang="en-US" b="1" dirty="0">
+                <a:latin typeface="Euclid Circular B" panose="020B0504000000000000" pitchFamily="34" charset="0"/>
+                <a:ea typeface="Euclid Circular B" panose="020B0504000000000000" pitchFamily="34" charset="0"/>
+              </a:rPr>
+              <a:t>change the behavior </a:t>
+            </a:r>
+            <a:r>
+              <a:rPr lang="en-US" dirty="0">
+                <a:latin typeface="Euclid Circular B" panose="020B0504000000000000" pitchFamily="34" charset="0"/>
+                <a:ea typeface="Euclid Circular B" panose="020B0504000000000000" pitchFamily="34" charset="0"/>
+              </a:rPr>
+              <a:t>of the application features on runtime based on the </a:t>
+            </a:r>
+            <a:r>
+              <a:rPr lang="en-US" b="1" dirty="0">
+                <a:latin typeface="Euclid Circular B" panose="020B0504000000000000" pitchFamily="34" charset="0"/>
+                <a:ea typeface="Euclid Circular B" panose="020B0504000000000000" pitchFamily="34" charset="0"/>
+              </a:rPr>
+              <a:t>current tenant</a:t>
+            </a:r>
+            <a:r>
+              <a:rPr lang="en-US" dirty="0">
+                <a:latin typeface="Euclid Circular B" panose="020B0504000000000000" pitchFamily="34" charset="0"/>
+                <a:ea typeface="Euclid Circular B" panose="020B0504000000000000" pitchFamily="34" charset="0"/>
+              </a:rPr>
+              <a:t>.</a:t>
+            </a:r>
+          </a:p>
+          <a:p>
+            <a:pPr marL="0" indent="0">
+              <a:buNone/>
+            </a:pPr>
+            <a:endParaRPr lang="en-US" dirty="0">
+              <a:latin typeface="Euclid Circular B" panose="020B0504000000000000" pitchFamily="34" charset="0"/>
+              <a:ea typeface="Euclid Circular B" panose="020B0504000000000000" pitchFamily="34" charset="0"/>
+            </a:endParaRPr>
+          </a:p>
+          <a:p>
+            <a:pPr marL="0" indent="0">
+              <a:buNone/>
+            </a:pPr>
+            <a:r>
+              <a:rPr lang="en-US" b="1" u="sng" dirty="0">
+                <a:latin typeface="Euclid Circular B" panose="020B0504000000000000" pitchFamily="34" charset="0"/>
+                <a:ea typeface="Euclid Circular B" panose="020B0504000000000000" pitchFamily="34" charset="0"/>
+              </a:rPr>
+              <a:t>How to use?</a:t>
+            </a:r>
+          </a:p>
+          <a:p>
+            <a:r>
+              <a:rPr lang="en-US" b="1" dirty="0">
+                <a:latin typeface="Euclid Circular B" panose="020B0504000000000000" pitchFamily="34" charset="0"/>
+                <a:ea typeface="Euclid Circular B" panose="020B0504000000000000" pitchFamily="34" charset="0"/>
+              </a:rPr>
+              <a:t>Define </a:t>
+            </a:r>
+            <a:r>
+              <a:rPr lang="en-US" dirty="0">
+                <a:latin typeface="Euclid Circular B" panose="020B0504000000000000" pitchFamily="34" charset="0"/>
+                <a:ea typeface="Euclid Circular B" panose="020B0504000000000000" pitchFamily="34" charset="0"/>
+              </a:rPr>
+              <a:t>your features by code</a:t>
+            </a:r>
+          </a:p>
+          <a:p>
+            <a:r>
+              <a:rPr lang="en-US" dirty="0">
+                <a:latin typeface="Euclid Circular B" panose="020B0504000000000000" pitchFamily="34" charset="0"/>
+                <a:ea typeface="Euclid Circular B" panose="020B0504000000000000" pitchFamily="34" charset="0"/>
+              </a:rPr>
+              <a:t>Use </a:t>
+            </a:r>
+            <a:r>
+              <a:rPr lang="en-US" b="1" dirty="0">
+                <a:latin typeface="Euclid Circular B" panose="020B0504000000000000" pitchFamily="34" charset="0"/>
+                <a:ea typeface="Euclid Circular B" panose="020B0504000000000000" pitchFamily="34" charset="0"/>
+              </a:rPr>
+              <a:t>[</a:t>
+            </a:r>
+            <a:r>
+              <a:rPr lang="en-US" b="1" dirty="0" err="1">
+                <a:latin typeface="Euclid Circular B" panose="020B0504000000000000" pitchFamily="34" charset="0"/>
+                <a:ea typeface="Euclid Circular B" panose="020B0504000000000000" pitchFamily="34" charset="0"/>
+              </a:rPr>
+              <a:t>RequiresFeature</a:t>
+            </a:r>
+            <a:r>
+              <a:rPr lang="en-US" b="1" dirty="0">
+                <a:latin typeface="Euclid Circular B" panose="020B0504000000000000" pitchFamily="34" charset="0"/>
+                <a:ea typeface="Euclid Circular B" panose="020B0504000000000000" pitchFamily="34" charset="0"/>
+              </a:rPr>
+              <a:t>]</a:t>
+            </a:r>
+            <a:r>
+              <a:rPr lang="en-US" dirty="0">
+                <a:latin typeface="Euclid Circular B" panose="020B0504000000000000" pitchFamily="34" charset="0"/>
+                <a:ea typeface="Euclid Circular B" panose="020B0504000000000000" pitchFamily="34" charset="0"/>
+              </a:rPr>
+              <a:t> attribute or </a:t>
+            </a:r>
+            <a:r>
+              <a:rPr lang="en-US" b="1" dirty="0" err="1">
+                <a:latin typeface="Euclid Circular B" panose="020B0504000000000000" pitchFamily="34" charset="0"/>
+                <a:ea typeface="Euclid Circular B" panose="020B0504000000000000" pitchFamily="34" charset="0"/>
+              </a:rPr>
+              <a:t>IFeatureChecker</a:t>
+            </a:r>
+            <a:r>
+              <a:rPr lang="en-US" dirty="0">
+                <a:latin typeface="Euclid Circular B" panose="020B0504000000000000" pitchFamily="34" charset="0"/>
+                <a:ea typeface="Euclid Circular B" panose="020B0504000000000000" pitchFamily="34" charset="0"/>
+              </a:rPr>
+              <a:t> service to control access</a:t>
+            </a:r>
+          </a:p>
+          <a:p>
+            <a:r>
+              <a:rPr lang="en-US" dirty="0">
+                <a:latin typeface="Euclid Circular B" panose="020B0504000000000000" pitchFamily="34" charset="0"/>
+                <a:ea typeface="Euclid Circular B" panose="020B0504000000000000" pitchFamily="34" charset="0"/>
+              </a:rPr>
+              <a:t>Use the </a:t>
+            </a:r>
+            <a:r>
+              <a:rPr lang="en-US" b="1" dirty="0">
+                <a:latin typeface="Euclid Circular B" panose="020B0504000000000000" pitchFamily="34" charset="0"/>
+                <a:ea typeface="Euclid Circular B" panose="020B0504000000000000" pitchFamily="34" charset="0"/>
+              </a:rPr>
+              <a:t>Management UI </a:t>
+            </a:r>
+            <a:r>
+              <a:rPr lang="en-US" dirty="0">
+                <a:latin typeface="Euclid Circular B" panose="020B0504000000000000" pitchFamily="34" charset="0"/>
+                <a:ea typeface="Euclid Circular B" panose="020B0504000000000000" pitchFamily="34" charset="0"/>
+              </a:rPr>
+              <a:t>to enable features for tenants</a:t>
+            </a:r>
+          </a:p>
+          <a:p>
+            <a:endParaRPr lang="en-US" dirty="0">
+              <a:latin typeface="Euclid Circular B" panose="020B0504000000000000" pitchFamily="34" charset="0"/>
+              <a:ea typeface="Euclid Circular B" panose="020B0504000000000000" pitchFamily="34" charset="0"/>
+            </a:endParaRPr>
           </a:p>
         </p:txBody>
       </p:sp>
@@ -5345,17 +5914,17 @@
                 <a:latin typeface="Euclid Circular B" panose="020B0504000000000000" pitchFamily="34" charset="0"/>
                 <a:ea typeface="Euclid Circular B" panose="020B0504000000000000" pitchFamily="34" charset="0"/>
               </a:rPr>
-              <a:t>Topic title</a:t>
-            </a:r>
-          </a:p>
-        </p:txBody>
-      </p:sp>
-      <p:sp>
-        <p:nvSpPr>
-          <p:cNvPr id="3" name="Content Placeholder 2">
-            <a:extLst>
-              <a:ext uri="{FF2B5EF4-FFF2-40B4-BE49-F238E27FC236}">
-                <a16:creationId xmlns:a16="http://schemas.microsoft.com/office/drawing/2014/main" id="{891C7693-D3DF-4635-96F4-97F3B4136FDF}"/>
+              <a:t>The Feature System</a:t>
+            </a:r>
+          </a:p>
+        </p:txBody>
+      </p:sp>
+      <p:sp>
+        <p:nvSpPr>
+          <p:cNvPr id="6" name="Content Placeholder 2">
+            <a:extLst>
+              <a:ext uri="{FF2B5EF4-FFF2-40B4-BE49-F238E27FC236}">
+                <a16:creationId xmlns:a16="http://schemas.microsoft.com/office/drawing/2014/main" id="{00A923CA-01BB-E694-7C48-9D8E963AB744}"/>
               </a:ext>
             </a:extLst>
           </p:cNvPr>
@@ -5366,18 +5935,32 @@
             <p:ph idx="1"/>
           </p:nvPr>
         </p:nvSpPr>
-        <p:spPr/>
-        <p:txBody>
-          <a:bodyPr/>
-          <a:lstStyle/>
-          <a:p>
-            <a:r>
-              <a:rPr lang="en-US" dirty="0">
-                <a:latin typeface="Euclid Circular B" panose="020B0504000000000000" pitchFamily="34" charset="0"/>
-                <a:ea typeface="Euclid Circular B" panose="020B0504000000000000" pitchFamily="34" charset="0"/>
-              </a:rPr>
-              <a:t>Content</a:t>
-            </a:r>
+        <p:spPr>
+          <a:xfrm>
+            <a:off x="838200" y="1825625"/>
+            <a:ext cx="10515600" cy="3434532"/>
+          </a:xfrm>
+        </p:spPr>
+        <p:txBody>
+          <a:bodyPr anchor="ctr">
+            <a:normAutofit/>
+          </a:bodyPr>
+          <a:lstStyle/>
+          <a:p>
+            <a:pPr marL="0" indent="0" algn="ctr">
+              <a:buNone/>
+            </a:pPr>
+            <a:r>
+              <a:rPr lang="tr-TR" sz="12000" dirty="0">
+                <a:latin typeface="Euclid Circular B" panose="020B0504000000000000" pitchFamily="34" charset="0"/>
+                <a:ea typeface="Euclid Circular B" panose="020B0504000000000000" pitchFamily="34" charset="0"/>
+              </a:rPr>
+              <a:t>DEMO</a:t>
+            </a:r>
+            <a:endParaRPr lang="en-US" sz="12000" dirty="0">
+              <a:latin typeface="Euclid Circular B" panose="020B0504000000000000" pitchFamily="34" charset="0"/>
+              <a:ea typeface="Euclid Circular B" panose="020B0504000000000000" pitchFamily="34" charset="0"/>
+            </a:endParaRPr>
           </a:p>
         </p:txBody>
       </p:sp>

</xml_diff>